<commit_message>
Added support for all images with new options
</commit_message>
<xml_diff>
--- a/ppt/diagrams.pptx
+++ b/ppt/diagrams.pptx
@@ -366,7 +366,7 @@
           <a:p>
             <a:fld id="{D2887149-AF03-6142-908A-3DD284EAF54B}" type="datetimeFigureOut">
               <a:rPr lang="en-US" smtClean="0"/>
-              <a:t>2/10/21</a:t>
+              <a:t>2/12/21</a:t>
             </a:fld>
             <a:endParaRPr lang="en-US"/>
           </a:p>
@@ -548,7 +548,7 @@
             <a:fld id="{0B25AC41-3BEC-9247-8322-91B80C013F2D}" type="datetimeFigureOut">
               <a:rPr lang="en-US" smtClean="0"/>
               <a:pPr/>
-              <a:t>2/10/21</a:t>
+              <a:t>2/12/21</a:t>
             </a:fld>
             <a:endParaRPr lang="en-US" dirty="0"/>
           </a:p>
@@ -20830,13 +20830,22 @@
           <a:p>
             <a:pPr algn="l"/>
             <a:r>
+              <a:rPr lang="en-US" sz="1200">
+                <a:ln w="0"/>
+                <a:solidFill>
+                  <a:schemeClr val="accent1"/>
+                </a:solidFill>
+              </a:rPr>
+              <a:t>EC2 </a:t>
+            </a:r>
+            <a:r>
               <a:rPr lang="en-US" sz="1200" dirty="0">
                 <a:ln w="0"/>
                 <a:solidFill>
                   <a:schemeClr val="accent1"/>
                 </a:solidFill>
               </a:rPr>
-              <a:t>EC@ Secure Tunnel Demo</a:t>
+              <a:t>Secure Tunnel Demo</a:t>
             </a:r>
           </a:p>
         </p:txBody>
@@ -31881,15 +31890,6 @@
 </file>
 
 <file path=customXml/item1.xml><?xml version="1.0" encoding="utf-8"?>
-<?mso-contentType ?>
-<FormTemplates xmlns="http://schemas.microsoft.com/sharepoint/v3/contenttype/forms">
-  <Display>DocumentLibraryForm</Display>
-  <Edit>DocumentLibraryForm</Edit>
-  <New>DocumentLibraryForm</New>
-</FormTemplates>
-</file>
-
-<file path=customXml/item2.xml><?xml version="1.0" encoding="utf-8"?>
 <ct:contentTypeSchema xmlns:ct="http://schemas.microsoft.com/office/2006/metadata/contentType" xmlns:ma="http://schemas.microsoft.com/office/2006/metadata/properties/metaAttributes" ct:_="" ma:_="" ma:contentTypeName="Document" ma:contentTypeID="0x010100D26A3D6C04DFD740953BA1B2B9E62D60" ma:contentTypeVersion="0" ma:contentTypeDescription="Create a new document." ma:contentTypeScope="" ma:versionID="26617cd14cd3af163c0e97ff614e520a">
   <xsd:schema xmlns:xsd="http://www.w3.org/2001/XMLSchema" xmlns:xs="http://www.w3.org/2001/XMLSchema" xmlns:p="http://schemas.microsoft.com/office/2006/metadata/properties" targetNamespace="http://schemas.microsoft.com/office/2006/metadata/properties" ma:root="true" ma:fieldsID="c64490b4aec6201516c3a874156f37b2">
     <xsd:element name="properties">
@@ -32003,6 +32003,15 @@
 </ct:contentTypeSchema>
 </file>
 
+<file path=customXml/item2.xml><?xml version="1.0" encoding="utf-8"?>
+<?mso-contentType ?>
+<FormTemplates xmlns="http://schemas.microsoft.com/sharepoint/v3/contenttype/forms">
+  <Display>DocumentLibraryForm</Display>
+  <Edit>DocumentLibraryForm</Edit>
+  <New>DocumentLibraryForm</New>
+</FormTemplates>
+</file>
+
 <file path=customXml/item3.xml><?xml version="1.0" encoding="utf-8"?>
 <p:properties xmlns:p="http://schemas.microsoft.com/office/2006/metadata/properties" xmlns:xsi="http://www.w3.org/2001/XMLSchema-instance">
   <documentManagement/>
@@ -32010,14 +32019,6 @@
 </file>
 
 <file path=customXml/itemProps1.xml><?xml version="1.0" encoding="utf-8"?>
-<ds:datastoreItem xmlns:ds="http://schemas.openxmlformats.org/officeDocument/2006/customXml" ds:itemID="{705B35A6-8B52-46A5-AE45-B98C6459DC10}">
-  <ds:schemaRefs>
-    <ds:schemaRef ds:uri="http://schemas.microsoft.com/sharepoint/v3/contenttype/forms"/>
-  </ds:schemaRefs>
-</ds:datastoreItem>
-</file>
-
-<file path=customXml/itemProps2.xml><?xml version="1.0" encoding="utf-8"?>
 <ds:datastoreItem xmlns:ds="http://schemas.openxmlformats.org/officeDocument/2006/customXml" ds:itemID="{51A3258A-222C-4488-825E-7520D001FB75}">
   <ds:schemaRefs>
     <ds:schemaRef ds:uri="http://schemas.microsoft.com/office/2006/metadata/contentType"/>
@@ -32029,6 +32030,14 @@
     <ds:schemaRef ds:uri="http://purl.org/dc/terms/"/>
     <ds:schemaRef ds:uri="http://schemas.microsoft.com/internal/obd"/>
     <ds:schemaRef ds:uri="http://schemas.microsoft.com/office/infopath/2007/PartnerControls"/>
+  </ds:schemaRefs>
+</ds:datastoreItem>
+</file>
+
+<file path=customXml/itemProps2.xml><?xml version="1.0" encoding="utf-8"?>
+<ds:datastoreItem xmlns:ds="http://schemas.openxmlformats.org/officeDocument/2006/customXml" ds:itemID="{705B35A6-8B52-46A5-AE45-B98C6459DC10}">
+  <ds:schemaRefs>
+    <ds:schemaRef ds:uri="http://schemas.microsoft.com/sharepoint/v3/contenttype/forms"/>
   </ds:schemaRefs>
 </ds:datastoreItem>
 </file>

</xml_diff>